<commit_message>
Resubmit E4T2 networksg, sshattempt and pipeline
</commit_message>
<xml_diff>
--- a/DevSecOpsPipline.pptx
+++ b/DevSecOpsPipline.pptx
@@ -2771,7 +2771,7 @@
             <a:pPr algn="ctr"/>
             <a:r>
               <a:rPr lang="en-US"/>
-              <a:t>AMI or Container Image Scanning</a:t>
+              <a:t>AMI or Container Image Scanning using Anchore</a:t>
             </a:r>
             <a:endParaRPr lang="en-US"/>
           </a:p>
@@ -2871,7 +2871,7 @@
             <a:pPr algn="ctr"/>
             <a:r>
               <a:rPr lang="en-US"/>
-              <a:t>Infrastructure as Code Compliance Scanning</a:t>
+              <a:t>Infrastructure as Code Compliance Scanning using Regula</a:t>
             </a:r>
             <a:endParaRPr lang="en-US"/>
           </a:p>
@@ -3021,7 +3021,7 @@
             <a:pPr algn="ctr"/>
             <a:r>
               <a:rPr lang="en-US"/>
-              <a:t>Post-deployment Compliance Scanning</a:t>
+              <a:t>Post-deployment Compliance Scanning using AWS Config</a:t>
             </a:r>
             <a:endParaRPr lang="en-US"/>
           </a:p>

</xml_diff>